<commit_message>
Updated the PPT text object reader order.
</commit_message>
<xml_diff>
--- a/Whiteboard design session/WDS trainer presentation - Cloud-native applications.pptx
+++ b/Whiteboard design session/WDS trainer presentation - Cloud-native applications.pptx
@@ -220,7 +220,7 @@
           <a:p>
             <a:fld id="{52A13B17-C506-4D51-BB37-16B365906619}" type="datetimeFigureOut">
               <a:rPr lang="en-US" smtClean="0"/>
-              <a:t>10/15/2019</a:t>
+              <a:t>12/9/2019</a:t>
             </a:fld>
             <a:endParaRPr lang="en-US" dirty="0"/>
           </a:p>
@@ -1680,7 +1680,7 @@
                 <a:ea typeface="+mn-ea"/>
                 <a:cs typeface="+mn-cs"/>
               </a:rPr>
-              <a:t>The easiest way to move to containers on Azure is to deploy containers to the Linux variant of App Service. However this option does not provide a full-featured container orchestration platform with highly customizable load balancing, dynamic service discovery, and a holistic approach to container monitoring.</a:t>
+              <a:t>The easiest way to move to containers on Azure is to deploy containers to the Linux variant of App Service. However, this option does not provide a full-featured container orchestration platform with highly customizable load balancing, dynamic service discovery, and a holistic approach to container monitoring.</a:t>
             </a:r>
           </a:p>
           <a:p>
@@ -1853,7 +1853,7 @@
                 <a:ea typeface="+mn-ea"/>
                 <a:cs typeface="+mn-cs"/>
               </a:rPr>
-              <a:t>With Kubernetes you will have additional features at your fingertips beyond the pure Docker approach including:</a:t>
+              <a:t>With Kubernetes, you will have additional features at your fingertips beyond the pure Docker approach including:</a:t>
             </a:r>
           </a:p>
           <a:p>
@@ -1868,7 +1868,31 @@
                 <a:ea typeface="+mn-ea"/>
                 <a:cs typeface="+mn-cs"/>
               </a:rPr>
-              <a:t>The Kubernetes management dashboard which includes web interface and remote APIs for managing, running, and scaling containers, including CICD integration options.</a:t>
+              <a:t>The Kubernetes management dashboard which </a:t>
+            </a:r>
+            <a:r>
+              <a:rPr lang="en-US" sz="1200" kern="1200">
+                <a:solidFill>
+                  <a:schemeClr val="tx1"/>
+                </a:solidFill>
+                <a:effectLst/>
+                <a:latin typeface="+mn-lt"/>
+                <a:ea typeface="+mn-ea"/>
+                <a:cs typeface="+mn-cs"/>
+              </a:rPr>
+              <a:t>includes the web </a:t>
+            </a:r>
+            <a:r>
+              <a:rPr lang="en-US" sz="1200" kern="1200" dirty="0">
+                <a:solidFill>
+                  <a:schemeClr val="tx1"/>
+                </a:solidFill>
+                <a:effectLst/>
+                <a:latin typeface="+mn-lt"/>
+                <a:ea typeface="+mn-ea"/>
+                <a:cs typeface="+mn-cs"/>
+              </a:rPr>
+              <a:t>interface and remote APIs for managing, running, and scaling containers, including CICD integration options.</a:t>
             </a:r>
           </a:p>
           <a:p>
@@ -2130,7 +2154,7 @@
                   <a:prstClr val="black"/>
                 </a:solidFill>
               </a:rPr>
-              <a:t>10/15/2019 4:11 PM</a:t>
+              <a:t>12/9/2019 5:01 PM</a:t>
             </a:fld>
             <a:endParaRPr lang="en-US" dirty="0">
               <a:solidFill>
@@ -16929,6 +16953,49 @@
       </p:grpSpPr>
       <p:sp>
         <p:nvSpPr>
+          <p:cNvPr id="2" name="Title 1"/>
+          <p:cNvSpPr>
+            <a:spLocks noGrp="1"/>
+          </p:cNvSpPr>
+          <p:nvPr>
+            <p:ph type="title"/>
+          </p:nvPr>
+        </p:nvSpPr>
+        <p:spPr/>
+        <p:txBody>
+          <a:bodyPr>
+            <a:normAutofit fontScale="90000"/>
+          </a:bodyPr>
+          <a:lstStyle/>
+          <a:p>
+            <a:r>
+              <a:rPr lang="en-US" sz="4900" dirty="0">
+                <a:solidFill>
+                  <a:schemeClr val="tx1"/>
+                </a:solidFill>
+                <a:cs typeface="Segoe UI" panose="020B0502040204020203" pitchFamily="34" charset="0"/>
+              </a:rPr>
+              <a:t>Preferred solution</a:t>
+            </a:r>
+            <a:br>
+              <a:rPr lang="en-US" dirty="0">
+                <a:solidFill>
+                  <a:schemeClr val="tx1"/>
+                </a:solidFill>
+                <a:latin typeface="Segoe UI" panose="020B0502040204020203" pitchFamily="34" charset="0"/>
+              </a:rPr>
+            </a:br>
+            <a:endParaRPr lang="en-US" sz="3236" dirty="0">
+              <a:solidFill>
+                <a:schemeClr val="tx1"/>
+              </a:solidFill>
+              <a:latin typeface="Segoe UI" panose="020B0502040204020203" pitchFamily="34" charset="0"/>
+            </a:endParaRPr>
+          </a:p>
+        </p:txBody>
+      </p:sp>
+      <p:sp>
+        <p:nvSpPr>
           <p:cNvPr id="3" name="Content Placeholder 2"/>
           <p:cNvSpPr>
             <a:spLocks noGrp="1"/>
@@ -16975,49 +17042,6 @@
               <a:solidFill>
                 <a:srgbClr val="FFFFFF"/>
               </a:solidFill>
-            </a:endParaRPr>
-          </a:p>
-        </p:txBody>
-      </p:sp>
-      <p:sp>
-        <p:nvSpPr>
-          <p:cNvPr id="2" name="Title 1"/>
-          <p:cNvSpPr>
-            <a:spLocks noGrp="1"/>
-          </p:cNvSpPr>
-          <p:nvPr>
-            <p:ph type="title"/>
-          </p:nvPr>
-        </p:nvSpPr>
-        <p:spPr/>
-        <p:txBody>
-          <a:bodyPr>
-            <a:normAutofit fontScale="90000"/>
-          </a:bodyPr>
-          <a:lstStyle/>
-          <a:p>
-            <a:r>
-              <a:rPr lang="en-US" sz="4900" dirty="0">
-                <a:solidFill>
-                  <a:schemeClr val="tx1"/>
-                </a:solidFill>
-                <a:cs typeface="Segoe UI" panose="020B0502040204020203" pitchFamily="34" charset="0"/>
-              </a:rPr>
-              <a:t>Preferred solution</a:t>
-            </a:r>
-            <a:br>
-              <a:rPr lang="en-US" dirty="0">
-                <a:solidFill>
-                  <a:schemeClr val="tx1"/>
-                </a:solidFill>
-                <a:latin typeface="Segoe UI" panose="020B0502040204020203" pitchFamily="34" charset="0"/>
-              </a:rPr>
-            </a:br>
-            <a:endParaRPr lang="en-US" sz="3236" dirty="0">
-              <a:solidFill>
-                <a:schemeClr val="tx1"/>
-              </a:solidFill>
-              <a:latin typeface="Segoe UI" panose="020B0502040204020203" pitchFamily="34" charset="0"/>
             </a:endParaRPr>
           </a:p>
         </p:txBody>
@@ -17427,6 +17451,49 @@
       </p:grpSpPr>
       <p:sp>
         <p:nvSpPr>
+          <p:cNvPr id="2" name="Title 1"/>
+          <p:cNvSpPr>
+            <a:spLocks noGrp="1"/>
+          </p:cNvSpPr>
+          <p:nvPr>
+            <p:ph type="title"/>
+          </p:nvPr>
+        </p:nvSpPr>
+        <p:spPr/>
+        <p:txBody>
+          <a:bodyPr>
+            <a:normAutofit fontScale="90000"/>
+          </a:bodyPr>
+          <a:lstStyle/>
+          <a:p>
+            <a:r>
+              <a:rPr lang="en-US" sz="4900" dirty="0">
+                <a:solidFill>
+                  <a:schemeClr val="tx1"/>
+                </a:solidFill>
+                <a:cs typeface="Segoe UI" panose="020B0502040204020203" pitchFamily="34" charset="0"/>
+              </a:rPr>
+              <a:t>Preferred objections handling</a:t>
+            </a:r>
+            <a:br>
+              <a:rPr lang="en-US" dirty="0">
+                <a:solidFill>
+                  <a:schemeClr val="tx1"/>
+                </a:solidFill>
+                <a:latin typeface="Segoe UI" panose="020B0502040204020203" pitchFamily="34" charset="0"/>
+              </a:rPr>
+            </a:br>
+            <a:endParaRPr lang="en-US" sz="3236" dirty="0">
+              <a:solidFill>
+                <a:schemeClr val="tx1"/>
+              </a:solidFill>
+              <a:latin typeface="Segoe UI" panose="020B0502040204020203" pitchFamily="34" charset="0"/>
+            </a:endParaRPr>
+          </a:p>
+        </p:txBody>
+      </p:sp>
+      <p:sp>
+        <p:nvSpPr>
           <p:cNvPr id="3" name="Content Placeholder 2"/>
           <p:cNvSpPr>
             <a:spLocks noGrp="1"/>
@@ -17476,49 +17543,6 @@
               <a:rPr lang="en-US" sz="2800" dirty="0"/>
               <a:t>Azure Kubernetes Services (AKS) – the ideal solution for a fully managed experience</a:t>
             </a:r>
-          </a:p>
-        </p:txBody>
-      </p:sp>
-      <p:sp>
-        <p:nvSpPr>
-          <p:cNvPr id="2" name="Title 1"/>
-          <p:cNvSpPr>
-            <a:spLocks noGrp="1"/>
-          </p:cNvSpPr>
-          <p:nvPr>
-            <p:ph type="title"/>
-          </p:nvPr>
-        </p:nvSpPr>
-        <p:spPr/>
-        <p:txBody>
-          <a:bodyPr>
-            <a:normAutofit fontScale="90000"/>
-          </a:bodyPr>
-          <a:lstStyle/>
-          <a:p>
-            <a:r>
-              <a:rPr lang="en-US" sz="4900" dirty="0">
-                <a:solidFill>
-                  <a:schemeClr val="tx1"/>
-                </a:solidFill>
-                <a:cs typeface="Segoe UI" panose="020B0502040204020203" pitchFamily="34" charset="0"/>
-              </a:rPr>
-              <a:t>Preferred objections handling</a:t>
-            </a:r>
-            <a:br>
-              <a:rPr lang="en-US" dirty="0">
-                <a:solidFill>
-                  <a:schemeClr val="tx1"/>
-                </a:solidFill>
-                <a:latin typeface="Segoe UI" panose="020B0502040204020203" pitchFamily="34" charset="0"/>
-              </a:rPr>
-            </a:br>
-            <a:endParaRPr lang="en-US" sz="3236" dirty="0">
-              <a:solidFill>
-                <a:schemeClr val="tx1"/>
-              </a:solidFill>
-              <a:latin typeface="Segoe UI" panose="020B0502040204020203" pitchFamily="34" charset="0"/>
-            </a:endParaRPr>
           </a:p>
         </p:txBody>
       </p:sp>
@@ -17562,6 +17586,49 @@
       </p:grpSpPr>
       <p:sp>
         <p:nvSpPr>
+          <p:cNvPr id="2" name="Title 1"/>
+          <p:cNvSpPr>
+            <a:spLocks noGrp="1"/>
+          </p:cNvSpPr>
+          <p:nvPr>
+            <p:ph type="title"/>
+          </p:nvPr>
+        </p:nvSpPr>
+        <p:spPr/>
+        <p:txBody>
+          <a:bodyPr>
+            <a:normAutofit fontScale="90000"/>
+          </a:bodyPr>
+          <a:lstStyle/>
+          <a:p>
+            <a:r>
+              <a:rPr lang="en-US" sz="4900" dirty="0">
+                <a:solidFill>
+                  <a:schemeClr val="tx1"/>
+                </a:solidFill>
+                <a:cs typeface="Segoe UI" panose="020B0502040204020203" pitchFamily="34" charset="0"/>
+              </a:rPr>
+              <a:t>Preferred objections handling</a:t>
+            </a:r>
+            <a:br>
+              <a:rPr lang="en-US" dirty="0">
+                <a:solidFill>
+                  <a:schemeClr val="tx1"/>
+                </a:solidFill>
+                <a:latin typeface="Segoe UI" panose="020B0502040204020203" pitchFamily="34" charset="0"/>
+              </a:rPr>
+            </a:br>
+            <a:endParaRPr lang="en-US" sz="3236" dirty="0">
+              <a:solidFill>
+                <a:schemeClr val="tx1"/>
+              </a:solidFill>
+              <a:latin typeface="Segoe UI" panose="020B0502040204020203" pitchFamily="34" charset="0"/>
+            </a:endParaRPr>
+          </a:p>
+        </p:txBody>
+      </p:sp>
+      <p:sp>
+        <p:nvSpPr>
           <p:cNvPr id="3" name="Content Placeholder 2"/>
           <p:cNvSpPr>
             <a:spLocks noGrp="1"/>
@@ -17602,49 +17669,6 @@
               <a:rPr lang="en-US" sz="2800" dirty="0"/>
               <a:t>The best option is to go with a managed cluster such as Azure Container Service (AKS), native to Azure</a:t>
             </a:r>
-          </a:p>
-        </p:txBody>
-      </p:sp>
-      <p:sp>
-        <p:nvSpPr>
-          <p:cNvPr id="2" name="Title 1"/>
-          <p:cNvSpPr>
-            <a:spLocks noGrp="1"/>
-          </p:cNvSpPr>
-          <p:nvPr>
-            <p:ph type="title"/>
-          </p:nvPr>
-        </p:nvSpPr>
-        <p:spPr/>
-        <p:txBody>
-          <a:bodyPr>
-            <a:normAutofit fontScale="90000"/>
-          </a:bodyPr>
-          <a:lstStyle/>
-          <a:p>
-            <a:r>
-              <a:rPr lang="en-US" sz="4900" dirty="0">
-                <a:solidFill>
-                  <a:schemeClr val="tx1"/>
-                </a:solidFill>
-                <a:cs typeface="Segoe UI" panose="020B0502040204020203" pitchFamily="34" charset="0"/>
-              </a:rPr>
-              <a:t>Preferred objections handling</a:t>
-            </a:r>
-            <a:br>
-              <a:rPr lang="en-US" dirty="0">
-                <a:solidFill>
-                  <a:schemeClr val="tx1"/>
-                </a:solidFill>
-                <a:latin typeface="Segoe UI" panose="020B0502040204020203" pitchFamily="34" charset="0"/>
-              </a:rPr>
-            </a:br>
-            <a:endParaRPr lang="en-US" sz="3236" dirty="0">
-              <a:solidFill>
-                <a:schemeClr val="tx1"/>
-              </a:solidFill>
-              <a:latin typeface="Segoe UI" panose="020B0502040204020203" pitchFamily="34" charset="0"/>
-            </a:endParaRPr>
           </a:p>
         </p:txBody>
       </p:sp>
@@ -17688,6 +17712,49 @@
       </p:grpSpPr>
       <p:sp>
         <p:nvSpPr>
+          <p:cNvPr id="2" name="Title 1"/>
+          <p:cNvSpPr>
+            <a:spLocks noGrp="1"/>
+          </p:cNvSpPr>
+          <p:nvPr>
+            <p:ph type="title"/>
+          </p:nvPr>
+        </p:nvSpPr>
+        <p:spPr/>
+        <p:txBody>
+          <a:bodyPr>
+            <a:normAutofit fontScale="90000"/>
+          </a:bodyPr>
+          <a:lstStyle/>
+          <a:p>
+            <a:r>
+              <a:rPr lang="en-US" sz="4900" dirty="0">
+                <a:solidFill>
+                  <a:schemeClr val="tx1"/>
+                </a:solidFill>
+                <a:cs typeface="Segoe UI" panose="020B0502040204020203" pitchFamily="34" charset="0"/>
+              </a:rPr>
+              <a:t>Customer quote</a:t>
+            </a:r>
+            <a:br>
+              <a:rPr lang="en-US" dirty="0">
+                <a:solidFill>
+                  <a:schemeClr val="tx1"/>
+                </a:solidFill>
+                <a:latin typeface="Segoe UI" panose="020B0502040204020203" pitchFamily="34" charset="0"/>
+              </a:rPr>
+            </a:br>
+            <a:endParaRPr lang="en-US" sz="3236" dirty="0">
+              <a:solidFill>
+                <a:schemeClr val="tx1"/>
+              </a:solidFill>
+              <a:latin typeface="Segoe UI" panose="020B0502040204020203" pitchFamily="34" charset="0"/>
+            </a:endParaRPr>
+          </a:p>
+        </p:txBody>
+      </p:sp>
+      <p:sp>
+        <p:nvSpPr>
           <p:cNvPr id="3" name="Content Placeholder 2"/>
           <p:cNvSpPr>
             <a:spLocks noGrp="1"/>
@@ -17772,49 +17839,6 @@
               <a:solidFill>
                 <a:schemeClr val="tx1"/>
               </a:solidFill>
-            </a:endParaRPr>
-          </a:p>
-        </p:txBody>
-      </p:sp>
-      <p:sp>
-        <p:nvSpPr>
-          <p:cNvPr id="2" name="Title 1"/>
-          <p:cNvSpPr>
-            <a:spLocks noGrp="1"/>
-          </p:cNvSpPr>
-          <p:nvPr>
-            <p:ph type="title"/>
-          </p:nvPr>
-        </p:nvSpPr>
-        <p:spPr/>
-        <p:txBody>
-          <a:bodyPr>
-            <a:normAutofit fontScale="90000"/>
-          </a:bodyPr>
-          <a:lstStyle/>
-          <a:p>
-            <a:r>
-              <a:rPr lang="en-US" sz="4900" dirty="0">
-                <a:solidFill>
-                  <a:schemeClr val="tx1"/>
-                </a:solidFill>
-                <a:cs typeface="Segoe UI" panose="020B0502040204020203" pitchFamily="34" charset="0"/>
-              </a:rPr>
-              <a:t>Customer quote</a:t>
-            </a:r>
-            <a:br>
-              <a:rPr lang="en-US" dirty="0">
-                <a:solidFill>
-                  <a:schemeClr val="tx1"/>
-                </a:solidFill>
-                <a:latin typeface="Segoe UI" panose="020B0502040204020203" pitchFamily="34" charset="0"/>
-              </a:rPr>
-            </a:br>
-            <a:endParaRPr lang="en-US" sz="3236" dirty="0">
-              <a:solidFill>
-                <a:schemeClr val="tx1"/>
-              </a:solidFill>
-              <a:latin typeface="Segoe UI" panose="020B0502040204020203" pitchFamily="34" charset="0"/>
             </a:endParaRPr>
           </a:p>
         </p:txBody>
@@ -18091,6 +18115,66 @@
       </p:grpSpPr>
       <p:sp>
         <p:nvSpPr>
+          <p:cNvPr id="2" name="Title 1"/>
+          <p:cNvSpPr>
+            <a:spLocks noGrp="1"/>
+          </p:cNvSpPr>
+          <p:nvPr>
+            <p:ph type="title"/>
+          </p:nvPr>
+        </p:nvSpPr>
+        <p:spPr/>
+        <p:txBody>
+          <a:bodyPr>
+            <a:normAutofit fontScale="90000"/>
+          </a:bodyPr>
+          <a:lstStyle/>
+          <a:p>
+            <a:r>
+              <a:rPr lang="en-US" sz="4900" dirty="0">
+                <a:solidFill>
+                  <a:schemeClr val="tx1"/>
+                </a:solidFill>
+                <a:cs typeface="Segoe UI" panose="020B0502040204020203" pitchFamily="34" charset="0"/>
+              </a:rPr>
+              <a:t>Customer </a:t>
+            </a:r>
+            <a:r>
+              <a:rPr lang="en-US" sz="4900" dirty="0">
+                <a:solidFill>
+                  <a:schemeClr val="tx1"/>
+                </a:solidFill>
+              </a:rPr>
+              <a:t>s</a:t>
+            </a:r>
+            <a:r>
+              <a:rPr lang="en-US" sz="4900" dirty="0">
+                <a:solidFill>
+                  <a:schemeClr val="tx1"/>
+                </a:solidFill>
+                <a:cs typeface="Segoe UI" panose="020B0502040204020203" pitchFamily="34" charset="0"/>
+              </a:rPr>
+              <a:t>ituation</a:t>
+            </a:r>
+            <a:br>
+              <a:rPr lang="en-US" dirty="0">
+                <a:solidFill>
+                  <a:schemeClr val="tx1"/>
+                </a:solidFill>
+                <a:latin typeface="Segoe UI" panose="020B0502040204020203" pitchFamily="34" charset="0"/>
+              </a:rPr>
+            </a:br>
+            <a:endParaRPr lang="en-US" sz="3236" dirty="0">
+              <a:solidFill>
+                <a:schemeClr val="tx1"/>
+              </a:solidFill>
+              <a:latin typeface="Segoe UI" panose="020B0502040204020203" pitchFamily="34" charset="0"/>
+            </a:endParaRPr>
+          </a:p>
+        </p:txBody>
+      </p:sp>
+      <p:sp>
+        <p:nvSpPr>
           <p:cNvPr id="3" name="Content Placeholder 2"/>
           <p:cNvSpPr>
             <a:spLocks noGrp="1"/>
@@ -18139,66 +18223,6 @@
               <a:solidFill>
                 <a:schemeClr val="tx1"/>
               </a:solidFill>
-            </a:endParaRPr>
-          </a:p>
-        </p:txBody>
-      </p:sp>
-      <p:sp>
-        <p:nvSpPr>
-          <p:cNvPr id="2" name="Title 1"/>
-          <p:cNvSpPr>
-            <a:spLocks noGrp="1"/>
-          </p:cNvSpPr>
-          <p:nvPr>
-            <p:ph type="title"/>
-          </p:nvPr>
-        </p:nvSpPr>
-        <p:spPr/>
-        <p:txBody>
-          <a:bodyPr>
-            <a:normAutofit fontScale="90000"/>
-          </a:bodyPr>
-          <a:lstStyle/>
-          <a:p>
-            <a:r>
-              <a:rPr lang="en-US" sz="4900" dirty="0">
-                <a:solidFill>
-                  <a:schemeClr val="tx1"/>
-                </a:solidFill>
-                <a:cs typeface="Segoe UI" panose="020B0502040204020203" pitchFamily="34" charset="0"/>
-              </a:rPr>
-              <a:t>Customer </a:t>
-            </a:r>
-            <a:r>
-              <a:rPr lang="en-US" sz="4900" dirty="0">
-                <a:solidFill>
-                  <a:schemeClr val="tx1"/>
-                </a:solidFill>
-              </a:rPr>
-              <a:t>s</a:t>
-            </a:r>
-            <a:r>
-              <a:rPr lang="en-US" sz="4900" dirty="0">
-                <a:solidFill>
-                  <a:schemeClr val="tx1"/>
-                </a:solidFill>
-                <a:cs typeface="Segoe UI" panose="020B0502040204020203" pitchFamily="34" charset="0"/>
-              </a:rPr>
-              <a:t>ituation</a:t>
-            </a:r>
-            <a:br>
-              <a:rPr lang="en-US" dirty="0">
-                <a:solidFill>
-                  <a:schemeClr val="tx1"/>
-                </a:solidFill>
-                <a:latin typeface="Segoe UI" panose="020B0502040204020203" pitchFamily="34" charset="0"/>
-              </a:rPr>
-            </a:br>
-            <a:endParaRPr lang="en-US" sz="3236" dirty="0">
-              <a:solidFill>
-                <a:schemeClr val="tx1"/>
-              </a:solidFill>
-              <a:latin typeface="Segoe UI" panose="020B0502040204020203" pitchFamily="34" charset="0"/>
             </a:endParaRPr>
           </a:p>
         </p:txBody>
@@ -18243,6 +18267,49 @@
       </p:grpSpPr>
       <p:sp>
         <p:nvSpPr>
+          <p:cNvPr id="2" name="Title 1"/>
+          <p:cNvSpPr>
+            <a:spLocks noGrp="1"/>
+          </p:cNvSpPr>
+          <p:nvPr>
+            <p:ph type="title"/>
+          </p:nvPr>
+        </p:nvSpPr>
+        <p:spPr/>
+        <p:txBody>
+          <a:bodyPr>
+            <a:normAutofit fontScale="90000"/>
+          </a:bodyPr>
+          <a:lstStyle/>
+          <a:p>
+            <a:r>
+              <a:rPr lang="en-US" sz="4900" dirty="0">
+                <a:solidFill>
+                  <a:schemeClr val="tx1"/>
+                </a:solidFill>
+                <a:cs typeface="Segoe UI" panose="020B0502040204020203" pitchFamily="34" charset="0"/>
+              </a:rPr>
+              <a:t>Customer situation</a:t>
+            </a:r>
+            <a:br>
+              <a:rPr lang="en-US" dirty="0">
+                <a:solidFill>
+                  <a:schemeClr val="tx1"/>
+                </a:solidFill>
+                <a:latin typeface="Segoe UI" panose="020B0502040204020203" pitchFamily="34" charset="0"/>
+              </a:rPr>
+            </a:br>
+            <a:endParaRPr lang="en-US" sz="3236" dirty="0">
+              <a:solidFill>
+                <a:schemeClr val="tx1"/>
+              </a:solidFill>
+              <a:latin typeface="Segoe UI" panose="020B0502040204020203" pitchFamily="34" charset="0"/>
+            </a:endParaRPr>
+          </a:p>
+        </p:txBody>
+      </p:sp>
+      <p:sp>
+        <p:nvSpPr>
           <p:cNvPr id="3" name="Content Placeholder 2"/>
           <p:cNvSpPr>
             <a:spLocks noGrp="1"/>
@@ -18288,49 +18355,6 @@
               <a:solidFill>
                 <a:schemeClr val="tx1"/>
               </a:solidFill>
-            </a:endParaRPr>
-          </a:p>
-        </p:txBody>
-      </p:sp>
-      <p:sp>
-        <p:nvSpPr>
-          <p:cNvPr id="2" name="Title 1"/>
-          <p:cNvSpPr>
-            <a:spLocks noGrp="1"/>
-          </p:cNvSpPr>
-          <p:nvPr>
-            <p:ph type="title"/>
-          </p:nvPr>
-        </p:nvSpPr>
-        <p:spPr/>
-        <p:txBody>
-          <a:bodyPr>
-            <a:normAutofit fontScale="90000"/>
-          </a:bodyPr>
-          <a:lstStyle/>
-          <a:p>
-            <a:r>
-              <a:rPr lang="en-US" sz="4900" dirty="0">
-                <a:solidFill>
-                  <a:schemeClr val="tx1"/>
-                </a:solidFill>
-                <a:cs typeface="Segoe UI" panose="020B0502040204020203" pitchFamily="34" charset="0"/>
-              </a:rPr>
-              <a:t>Customer situation</a:t>
-            </a:r>
-            <a:br>
-              <a:rPr lang="en-US" dirty="0">
-                <a:solidFill>
-                  <a:schemeClr val="tx1"/>
-                </a:solidFill>
-                <a:latin typeface="Segoe UI" panose="020B0502040204020203" pitchFamily="34" charset="0"/>
-              </a:rPr>
-            </a:br>
-            <a:endParaRPr lang="en-US" sz="3236" dirty="0">
-              <a:solidFill>
-                <a:schemeClr val="tx1"/>
-              </a:solidFill>
-              <a:latin typeface="Segoe UI" panose="020B0502040204020203" pitchFamily="34" charset="0"/>
             </a:endParaRPr>
           </a:p>
         </p:txBody>
@@ -18375,6 +18399,49 @@
       </p:grpSpPr>
       <p:sp>
         <p:nvSpPr>
+          <p:cNvPr id="2" name="Title 1"/>
+          <p:cNvSpPr>
+            <a:spLocks noGrp="1"/>
+          </p:cNvSpPr>
+          <p:nvPr>
+            <p:ph type="title"/>
+          </p:nvPr>
+        </p:nvSpPr>
+        <p:spPr/>
+        <p:txBody>
+          <a:bodyPr>
+            <a:normAutofit fontScale="90000"/>
+          </a:bodyPr>
+          <a:lstStyle/>
+          <a:p>
+            <a:r>
+              <a:rPr lang="en-US" sz="4900" dirty="0">
+                <a:solidFill>
+                  <a:schemeClr val="tx1"/>
+                </a:solidFill>
+                <a:cs typeface="Segoe UI" panose="020B0502040204020203" pitchFamily="34" charset="0"/>
+              </a:rPr>
+              <a:t>Customer situation</a:t>
+            </a:r>
+            <a:br>
+              <a:rPr lang="en-US" dirty="0">
+                <a:solidFill>
+                  <a:schemeClr val="tx1"/>
+                </a:solidFill>
+                <a:latin typeface="Segoe UI" panose="020B0502040204020203" pitchFamily="34" charset="0"/>
+              </a:rPr>
+            </a:br>
+            <a:endParaRPr lang="en-US" sz="3236" dirty="0">
+              <a:solidFill>
+                <a:schemeClr val="tx1"/>
+              </a:solidFill>
+              <a:latin typeface="Segoe UI" panose="020B0502040204020203" pitchFamily="34" charset="0"/>
+            </a:endParaRPr>
+          </a:p>
+        </p:txBody>
+      </p:sp>
+      <p:sp>
+        <p:nvSpPr>
           <p:cNvPr id="3" name="Content Placeholder 2"/>
           <p:cNvSpPr>
             <a:spLocks noGrp="1"/>
@@ -18448,49 +18515,6 @@
               <a:solidFill>
                 <a:schemeClr val="tx1"/>
               </a:solidFill>
-            </a:endParaRPr>
-          </a:p>
-        </p:txBody>
-      </p:sp>
-      <p:sp>
-        <p:nvSpPr>
-          <p:cNvPr id="2" name="Title 1"/>
-          <p:cNvSpPr>
-            <a:spLocks noGrp="1"/>
-          </p:cNvSpPr>
-          <p:nvPr>
-            <p:ph type="title"/>
-          </p:nvPr>
-        </p:nvSpPr>
-        <p:spPr/>
-        <p:txBody>
-          <a:bodyPr>
-            <a:normAutofit fontScale="90000"/>
-          </a:bodyPr>
-          <a:lstStyle/>
-          <a:p>
-            <a:r>
-              <a:rPr lang="en-US" sz="4900" dirty="0">
-                <a:solidFill>
-                  <a:schemeClr val="tx1"/>
-                </a:solidFill>
-                <a:cs typeface="Segoe UI" panose="020B0502040204020203" pitchFamily="34" charset="0"/>
-              </a:rPr>
-              <a:t>Customer situation</a:t>
-            </a:r>
-            <a:br>
-              <a:rPr lang="en-US" dirty="0">
-                <a:solidFill>
-                  <a:schemeClr val="tx1"/>
-                </a:solidFill>
-                <a:latin typeface="Segoe UI" panose="020B0502040204020203" pitchFamily="34" charset="0"/>
-              </a:rPr>
-            </a:br>
-            <a:endParaRPr lang="en-US" sz="3236" dirty="0">
-              <a:solidFill>
-                <a:schemeClr val="tx1"/>
-              </a:solidFill>
-              <a:latin typeface="Segoe UI" panose="020B0502040204020203" pitchFamily="34" charset="0"/>
             </a:endParaRPr>
           </a:p>
         </p:txBody>
@@ -18535,6 +18559,49 @@
       </p:grpSpPr>
       <p:sp>
         <p:nvSpPr>
+          <p:cNvPr id="2" name="Title 1"/>
+          <p:cNvSpPr>
+            <a:spLocks noGrp="1"/>
+          </p:cNvSpPr>
+          <p:nvPr>
+            <p:ph type="title"/>
+          </p:nvPr>
+        </p:nvSpPr>
+        <p:spPr/>
+        <p:txBody>
+          <a:bodyPr>
+            <a:normAutofit fontScale="90000"/>
+          </a:bodyPr>
+          <a:lstStyle/>
+          <a:p>
+            <a:r>
+              <a:rPr lang="en-US" sz="4900" dirty="0">
+                <a:solidFill>
+                  <a:schemeClr val="tx1"/>
+                </a:solidFill>
+                <a:cs typeface="Segoe UI" panose="020B0502040204020203" pitchFamily="34" charset="0"/>
+              </a:rPr>
+              <a:t>Customer situation</a:t>
+            </a:r>
+            <a:br>
+              <a:rPr lang="en-US" dirty="0">
+                <a:solidFill>
+                  <a:schemeClr val="tx1"/>
+                </a:solidFill>
+                <a:latin typeface="Segoe UI" panose="020B0502040204020203" pitchFamily="34" charset="0"/>
+              </a:rPr>
+            </a:br>
+            <a:endParaRPr lang="en-US" sz="3236" dirty="0">
+              <a:solidFill>
+                <a:schemeClr val="tx1"/>
+              </a:solidFill>
+              <a:latin typeface="Segoe UI" panose="020B0502040204020203" pitchFamily="34" charset="0"/>
+            </a:endParaRPr>
+          </a:p>
+        </p:txBody>
+      </p:sp>
+      <p:sp>
+        <p:nvSpPr>
           <p:cNvPr id="3" name="Content Placeholder 2"/>
           <p:cNvSpPr>
             <a:spLocks noGrp="1"/>
@@ -18581,49 +18648,6 @@
               <a:rPr lang="en-US" sz="2800" b="1" dirty="0"/>
               <a:t>The data back-end is a MongoDB cluster also deployed to Windows Server machines on premise.</a:t>
             </a:r>
-          </a:p>
-        </p:txBody>
-      </p:sp>
-      <p:sp>
-        <p:nvSpPr>
-          <p:cNvPr id="2" name="Title 1"/>
-          <p:cNvSpPr>
-            <a:spLocks noGrp="1"/>
-          </p:cNvSpPr>
-          <p:nvPr>
-            <p:ph type="title"/>
-          </p:nvPr>
-        </p:nvSpPr>
-        <p:spPr/>
-        <p:txBody>
-          <a:bodyPr>
-            <a:normAutofit fontScale="90000"/>
-          </a:bodyPr>
-          <a:lstStyle/>
-          <a:p>
-            <a:r>
-              <a:rPr lang="en-US" sz="4900" dirty="0">
-                <a:solidFill>
-                  <a:schemeClr val="tx1"/>
-                </a:solidFill>
-                <a:cs typeface="Segoe UI" panose="020B0502040204020203" pitchFamily="34" charset="0"/>
-              </a:rPr>
-              <a:t>Customer situation</a:t>
-            </a:r>
-            <a:br>
-              <a:rPr lang="en-US" dirty="0">
-                <a:solidFill>
-                  <a:schemeClr val="tx1"/>
-                </a:solidFill>
-                <a:latin typeface="Segoe UI" panose="020B0502040204020203" pitchFamily="34" charset="0"/>
-              </a:rPr>
-            </a:br>
-            <a:endParaRPr lang="en-US" sz="3236" dirty="0">
-              <a:solidFill>
-                <a:schemeClr val="tx1"/>
-              </a:solidFill>
-              <a:latin typeface="Segoe UI" panose="020B0502040204020203" pitchFamily="34" charset="0"/>
-            </a:endParaRPr>
           </a:p>
         </p:txBody>
       </p:sp>
@@ -18667,6 +18691,49 @@
       </p:grpSpPr>
       <p:sp>
         <p:nvSpPr>
+          <p:cNvPr id="2" name="Title 1"/>
+          <p:cNvSpPr>
+            <a:spLocks noGrp="1"/>
+          </p:cNvSpPr>
+          <p:nvPr>
+            <p:ph type="title"/>
+          </p:nvPr>
+        </p:nvSpPr>
+        <p:spPr/>
+        <p:txBody>
+          <a:bodyPr>
+            <a:normAutofit fontScale="90000"/>
+          </a:bodyPr>
+          <a:lstStyle/>
+          <a:p>
+            <a:r>
+              <a:rPr lang="en-US" sz="4900" dirty="0">
+                <a:solidFill>
+                  <a:schemeClr val="tx1"/>
+                </a:solidFill>
+                <a:cs typeface="Segoe UI" panose="020B0502040204020203" pitchFamily="34" charset="0"/>
+              </a:rPr>
+              <a:t>Customer situation</a:t>
+            </a:r>
+            <a:br>
+              <a:rPr lang="en-US" dirty="0">
+                <a:solidFill>
+                  <a:schemeClr val="tx1"/>
+                </a:solidFill>
+                <a:latin typeface="Segoe UI" panose="020B0502040204020203" pitchFamily="34" charset="0"/>
+              </a:rPr>
+            </a:br>
+            <a:endParaRPr lang="en-US" sz="3236" dirty="0">
+              <a:solidFill>
+                <a:schemeClr val="tx1"/>
+              </a:solidFill>
+              <a:latin typeface="Segoe UI" panose="020B0502040204020203" pitchFamily="34" charset="0"/>
+            </a:endParaRPr>
+          </a:p>
+        </p:txBody>
+      </p:sp>
+      <p:sp>
+        <p:nvSpPr>
           <p:cNvPr id="3" name="Content Placeholder 2"/>
           <p:cNvSpPr>
             <a:spLocks noGrp="1"/>
@@ -18738,49 +18805,6 @@
           <a:p>
             <a:pPr lvl="0" fontAlgn="base"/>
             <a:endParaRPr lang="en-US" sz="2000" b="1" dirty="0"/>
-          </a:p>
-        </p:txBody>
-      </p:sp>
-      <p:sp>
-        <p:nvSpPr>
-          <p:cNvPr id="2" name="Title 1"/>
-          <p:cNvSpPr>
-            <a:spLocks noGrp="1"/>
-          </p:cNvSpPr>
-          <p:nvPr>
-            <p:ph type="title"/>
-          </p:nvPr>
-        </p:nvSpPr>
-        <p:spPr/>
-        <p:txBody>
-          <a:bodyPr>
-            <a:normAutofit fontScale="90000"/>
-          </a:bodyPr>
-          <a:lstStyle/>
-          <a:p>
-            <a:r>
-              <a:rPr lang="en-US" sz="4900" dirty="0">
-                <a:solidFill>
-                  <a:schemeClr val="tx1"/>
-                </a:solidFill>
-                <a:cs typeface="Segoe UI" panose="020B0502040204020203" pitchFamily="34" charset="0"/>
-              </a:rPr>
-              <a:t>Customer situation</a:t>
-            </a:r>
-            <a:br>
-              <a:rPr lang="en-US" dirty="0">
-                <a:solidFill>
-                  <a:schemeClr val="tx1"/>
-                </a:solidFill>
-                <a:latin typeface="Segoe UI" panose="020B0502040204020203" pitchFamily="34" charset="0"/>
-              </a:rPr>
-            </a:br>
-            <a:endParaRPr lang="en-US" sz="3236" dirty="0">
-              <a:solidFill>
-                <a:schemeClr val="tx1"/>
-              </a:solidFill>
-              <a:latin typeface="Segoe UI" panose="020B0502040204020203" pitchFamily="34" charset="0"/>
-            </a:endParaRPr>
           </a:p>
         </p:txBody>
       </p:sp>
@@ -18822,6 +18846,49 @@
           <a:chExt cx="0" cy="0"/>
         </a:xfrm>
       </p:grpSpPr>
+      <p:sp>
+        <p:nvSpPr>
+          <p:cNvPr id="2" name="Title 1"/>
+          <p:cNvSpPr>
+            <a:spLocks noGrp="1"/>
+          </p:cNvSpPr>
+          <p:nvPr>
+            <p:ph type="title"/>
+          </p:nvPr>
+        </p:nvSpPr>
+        <p:spPr/>
+        <p:txBody>
+          <a:bodyPr>
+            <a:normAutofit fontScale="90000"/>
+          </a:bodyPr>
+          <a:lstStyle/>
+          <a:p>
+            <a:r>
+              <a:rPr lang="en-US" sz="4900" dirty="0">
+                <a:solidFill>
+                  <a:schemeClr val="tx1"/>
+                </a:solidFill>
+                <a:cs typeface="Segoe UI" panose="020B0502040204020203" pitchFamily="34" charset="0"/>
+              </a:rPr>
+              <a:t>Customer situation</a:t>
+            </a:r>
+            <a:br>
+              <a:rPr lang="en-US" dirty="0">
+                <a:solidFill>
+                  <a:schemeClr val="tx1"/>
+                </a:solidFill>
+                <a:latin typeface="Segoe UI" panose="020B0502040204020203" pitchFamily="34" charset="0"/>
+              </a:rPr>
+            </a:br>
+            <a:endParaRPr lang="en-US" sz="3236" dirty="0">
+              <a:solidFill>
+                <a:schemeClr val="tx1"/>
+              </a:solidFill>
+              <a:latin typeface="Segoe UI" panose="020B0502040204020203" pitchFamily="34" charset="0"/>
+            </a:endParaRPr>
+          </a:p>
+        </p:txBody>
+      </p:sp>
       <p:pic>
         <p:nvPicPr>
           <p:cNvPr id="4" name="Graphic 3" descr="Speech icon">
@@ -18936,49 +19003,6 @@
               <a:rPr lang="en-US" sz="2800" b="1" dirty="0"/>
               <a:t>Increase visibility into system operations and health</a:t>
             </a:r>
-          </a:p>
-        </p:txBody>
-      </p:sp>
-      <p:sp>
-        <p:nvSpPr>
-          <p:cNvPr id="2" name="Title 1"/>
-          <p:cNvSpPr>
-            <a:spLocks noGrp="1"/>
-          </p:cNvSpPr>
-          <p:nvPr>
-            <p:ph type="title"/>
-          </p:nvPr>
-        </p:nvSpPr>
-        <p:spPr/>
-        <p:txBody>
-          <a:bodyPr>
-            <a:normAutofit fontScale="90000"/>
-          </a:bodyPr>
-          <a:lstStyle/>
-          <a:p>
-            <a:r>
-              <a:rPr lang="en-US" sz="4900" dirty="0">
-                <a:solidFill>
-                  <a:schemeClr val="tx1"/>
-                </a:solidFill>
-                <a:cs typeface="Segoe UI" panose="020B0502040204020203" pitchFamily="34" charset="0"/>
-              </a:rPr>
-              <a:t>Customer situation</a:t>
-            </a:r>
-            <a:br>
-              <a:rPr lang="en-US" dirty="0">
-                <a:solidFill>
-                  <a:schemeClr val="tx1"/>
-                </a:solidFill>
-                <a:latin typeface="Segoe UI" panose="020B0502040204020203" pitchFamily="34" charset="0"/>
-              </a:rPr>
-            </a:br>
-            <a:endParaRPr lang="en-US" sz="3236" dirty="0">
-              <a:solidFill>
-                <a:schemeClr val="tx1"/>
-              </a:solidFill>
-              <a:latin typeface="Segoe UI" panose="020B0502040204020203" pitchFamily="34" charset="0"/>
-            </a:endParaRPr>
           </a:p>
         </p:txBody>
       </p:sp>

</xml_diff>